<commit_message>
final upload before presentation
</commit_message>
<xml_diff>
--- a/Citi Bike.pptx
+++ b/Citi Bike.pptx
@@ -22,13 +22,11 @@
     <p:sldId id="282" r:id="rId16"/>
     <p:sldId id="288" r:id="rId17"/>
     <p:sldId id="284" r:id="rId18"/>
-    <p:sldId id="285" r:id="rId19"/>
+    <p:sldId id="283" r:id="rId19"/>
     <p:sldId id="286" r:id="rId20"/>
-    <p:sldId id="283" r:id="rId21"/>
-    <p:sldId id="269" r:id="rId22"/>
-    <p:sldId id="270" r:id="rId23"/>
-    <p:sldId id="271" r:id="rId24"/>
-    <p:sldId id="274" r:id="rId25"/>
+    <p:sldId id="292" r:id="rId21"/>
+    <p:sldId id="291" r:id="rId22"/>
+    <p:sldId id="274" r:id="rId23"/>
   </p:sldIdLst>
   <p:sldSz cx="12192000" cy="6858000"/>
   <p:notesSz cx="6858000" cy="9144000"/>
@@ -284,7 +282,7 @@
           <a:p>
             <a:fld id="{94B95F32-165F-409D-9DFB-67458F6B5B60}" type="datetimeFigureOut">
               <a:rPr lang="ko-KR" altLang="en-US" smtClean="0"/>
-              <a:t>2020-12-28</a:t>
+              <a:t>2020-12-29</a:t>
             </a:fld>
             <a:endParaRPr lang="ko-KR" altLang="en-US"/>
           </a:p>
@@ -484,7 +482,7 @@
           <a:p>
             <a:fld id="{94B95F32-165F-409D-9DFB-67458F6B5B60}" type="datetimeFigureOut">
               <a:rPr lang="ko-KR" altLang="en-US" smtClean="0"/>
-              <a:t>2020-12-28</a:t>
+              <a:t>2020-12-29</a:t>
             </a:fld>
             <a:endParaRPr lang="ko-KR" altLang="en-US"/>
           </a:p>
@@ -694,7 +692,7 @@
           <a:p>
             <a:fld id="{94B95F32-165F-409D-9DFB-67458F6B5B60}" type="datetimeFigureOut">
               <a:rPr lang="ko-KR" altLang="en-US" smtClean="0"/>
-              <a:t>2020-12-28</a:t>
+              <a:t>2020-12-29</a:t>
             </a:fld>
             <a:endParaRPr lang="ko-KR" altLang="en-US"/>
           </a:p>
@@ -894,7 +892,7 @@
           <a:p>
             <a:fld id="{94B95F32-165F-409D-9DFB-67458F6B5B60}" type="datetimeFigureOut">
               <a:rPr lang="ko-KR" altLang="en-US" smtClean="0"/>
-              <a:t>2020-12-28</a:t>
+              <a:t>2020-12-29</a:t>
             </a:fld>
             <a:endParaRPr lang="ko-KR" altLang="en-US"/>
           </a:p>
@@ -1170,7 +1168,7 @@
           <a:p>
             <a:fld id="{94B95F32-165F-409D-9DFB-67458F6B5B60}" type="datetimeFigureOut">
               <a:rPr lang="ko-KR" altLang="en-US" smtClean="0"/>
-              <a:t>2020-12-28</a:t>
+              <a:t>2020-12-29</a:t>
             </a:fld>
             <a:endParaRPr lang="ko-KR" altLang="en-US"/>
           </a:p>
@@ -1438,7 +1436,7 @@
           <a:p>
             <a:fld id="{94B95F32-165F-409D-9DFB-67458F6B5B60}" type="datetimeFigureOut">
               <a:rPr lang="ko-KR" altLang="en-US" smtClean="0"/>
-              <a:t>2020-12-28</a:t>
+              <a:t>2020-12-29</a:t>
             </a:fld>
             <a:endParaRPr lang="ko-KR" altLang="en-US"/>
           </a:p>
@@ -1853,7 +1851,7 @@
           <a:p>
             <a:fld id="{94B95F32-165F-409D-9DFB-67458F6B5B60}" type="datetimeFigureOut">
               <a:rPr lang="ko-KR" altLang="en-US" smtClean="0"/>
-              <a:t>2020-12-28</a:t>
+              <a:t>2020-12-29</a:t>
             </a:fld>
             <a:endParaRPr lang="ko-KR" altLang="en-US"/>
           </a:p>
@@ -1995,7 +1993,7 @@
           <a:p>
             <a:fld id="{94B95F32-165F-409D-9DFB-67458F6B5B60}" type="datetimeFigureOut">
               <a:rPr lang="ko-KR" altLang="en-US" smtClean="0"/>
-              <a:t>2020-12-28</a:t>
+              <a:t>2020-12-29</a:t>
             </a:fld>
             <a:endParaRPr lang="ko-KR" altLang="en-US"/>
           </a:p>
@@ -2108,7 +2106,7 @@
           <a:p>
             <a:fld id="{94B95F32-165F-409D-9DFB-67458F6B5B60}" type="datetimeFigureOut">
               <a:rPr lang="ko-KR" altLang="en-US" smtClean="0"/>
-              <a:t>2020-12-28</a:t>
+              <a:t>2020-12-29</a:t>
             </a:fld>
             <a:endParaRPr lang="ko-KR" altLang="en-US"/>
           </a:p>
@@ -2421,7 +2419,7 @@
           <a:p>
             <a:fld id="{94B95F32-165F-409D-9DFB-67458F6B5B60}" type="datetimeFigureOut">
               <a:rPr lang="ko-KR" altLang="en-US" smtClean="0"/>
-              <a:t>2020-12-28</a:t>
+              <a:t>2020-12-29</a:t>
             </a:fld>
             <a:endParaRPr lang="ko-KR" altLang="en-US"/>
           </a:p>
@@ -2710,7 +2708,7 @@
           <a:p>
             <a:fld id="{94B95F32-165F-409D-9DFB-67458F6B5B60}" type="datetimeFigureOut">
               <a:rPr lang="ko-KR" altLang="en-US" smtClean="0"/>
-              <a:t>2020-12-28</a:t>
+              <a:t>2020-12-29</a:t>
             </a:fld>
             <a:endParaRPr lang="ko-KR" altLang="en-US"/>
           </a:p>
@@ -2953,7 +2951,7 @@
           <a:p>
             <a:fld id="{94B95F32-165F-409D-9DFB-67458F6B5B60}" type="datetimeFigureOut">
               <a:rPr lang="ko-KR" altLang="en-US" smtClean="0"/>
-              <a:t>2020-12-28</a:t>
+              <a:t>2020-12-29</a:t>
             </a:fld>
             <a:endParaRPr lang="ko-KR" altLang="en-US"/>
           </a:p>
@@ -4975,10 +4973,10 @@
       </p:sp>
       <p:pic>
         <p:nvPicPr>
-          <p:cNvPr id="4" name="Picture 3">
-            <a:extLst>
-              <a:ext uri="{FF2B5EF4-FFF2-40B4-BE49-F238E27FC236}">
-                <a16:creationId xmlns:a16="http://schemas.microsoft.com/office/drawing/2014/main" id="{B9177FF9-822B-4E42-A057-4F1D5BCDA2B7}"/>
+          <p:cNvPr id="5" name="Picture 4">
+            <a:extLst>
+              <a:ext uri="{FF2B5EF4-FFF2-40B4-BE49-F238E27FC236}">
+                <a16:creationId xmlns:a16="http://schemas.microsoft.com/office/drawing/2014/main" id="{C64D7708-B859-4B9A-9007-1A24C1961074}"/>
               </a:ext>
             </a:extLst>
           </p:cNvPr>
@@ -4987,20 +4985,20 @@
           </p:cNvPicPr>
           <p:nvPr/>
         </p:nvPicPr>
-        <p:blipFill rotWithShape="1">
+        <p:blipFill>
           <a:blip r:embed="rId2"/>
-          <a:srcRect r="1" b="16551"/>
-          <a:stretch/>
+          <a:stretch>
+            <a:fillRect/>
+          </a:stretch>
         </p:blipFill>
         <p:spPr>
           <a:xfrm>
-            <a:off x="2170029" y="804672"/>
-            <a:ext cx="7851943" cy="3554676"/>
+            <a:off x="-2" y="-1"/>
+            <a:ext cx="12218321" cy="6791325"/>
           </a:xfrm>
           <a:prstGeom prst="rect">
             <a:avLst/>
           </a:prstGeom>
-          <a:effectLst/>
         </p:spPr>
       </p:pic>
     </p:spTree>
@@ -5243,8 +5241,8 @@
         </p:blipFill>
         <p:spPr>
           <a:xfrm>
-            <a:off x="2004562" y="185709"/>
-            <a:ext cx="8252942" cy="4335492"/>
+            <a:off x="-2" y="102"/>
+            <a:ext cx="12192000" cy="6404785"/>
           </a:xfrm>
           <a:prstGeom prst="rect">
             <a:avLst/>
@@ -5515,50 +5513,6 @@
           </a:prstGeom>
         </p:spPr>
       </p:pic>
-      <p:sp>
-        <p:nvSpPr>
-          <p:cNvPr id="7" name="TextBox 6">
-            <a:extLst>
-              <a:ext uri="{FF2B5EF4-FFF2-40B4-BE49-F238E27FC236}">
-                <a16:creationId xmlns:a16="http://schemas.microsoft.com/office/drawing/2014/main" id="{DFCF509B-5B08-46A6-B6EC-570BC9C8583C}"/>
-              </a:ext>
-            </a:extLst>
-          </p:cNvPr>
-          <p:cNvSpPr txBox="1"/>
-          <p:nvPr/>
-        </p:nvSpPr>
-        <p:spPr>
-          <a:xfrm>
-            <a:off x="4257675" y="5264106"/>
-            <a:ext cx="7286243" cy="923330"/>
-          </a:xfrm>
-          <a:prstGeom prst="rect">
-            <a:avLst/>
-          </a:prstGeom>
-          <a:noFill/>
-        </p:spPr>
-        <p:txBody>
-          <a:bodyPr wrap="square" rtlCol="0">
-            <a:spAutoFit/>
-          </a:bodyPr>
-          <a:lstStyle/>
-          <a:p>
-            <a:r>
-              <a:rPr lang="en-US" altLang="ko-KR">
-                <a:solidFill>
-                  <a:schemeClr val="bg1"/>
-                </a:solidFill>
-              </a:rPr>
-              <a:t>Customer is mostly distributed during the day when people are usually active. However, Subscribers are the most frequent during rush hour, 7, 8, 9 AM and 14, 15, 16, and 17 PM.</a:t>
-            </a:r>
-            <a:endParaRPr lang="ko-KR" altLang="en-US" dirty="0">
-              <a:solidFill>
-                <a:schemeClr val="bg1"/>
-              </a:solidFill>
-            </a:endParaRPr>
-          </a:p>
-        </p:txBody>
-      </p:sp>
     </p:spTree>
     <p:extLst>
       <p:ext uri="{BB962C8B-B14F-4D97-AF65-F5344CB8AC3E}">
@@ -5597,54 +5551,6 @@
           <a:chExt cx="0" cy="0"/>
         </a:xfrm>
       </p:grpSpPr>
-      <p:sp>
-        <p:nvSpPr>
-          <p:cNvPr id="3" name="Subtitle 2">
-            <a:extLst>
-              <a:ext uri="{FF2B5EF4-FFF2-40B4-BE49-F238E27FC236}">
-                <a16:creationId xmlns:a16="http://schemas.microsoft.com/office/drawing/2014/main" id="{C63068C7-FF93-4F55-8D49-8E391F78232D}"/>
-              </a:ext>
-            </a:extLst>
-          </p:cNvPr>
-          <p:cNvSpPr>
-            <a:spLocks noGrp="1"/>
-          </p:cNvSpPr>
-          <p:nvPr>
-            <p:ph type="subTitle" idx="1"/>
-          </p:nvPr>
-        </p:nvSpPr>
-        <p:spPr>
-          <a:xfrm>
-            <a:off x="2762250" y="5353049"/>
-            <a:ext cx="7915275" cy="1504949"/>
-          </a:xfrm>
-          <a:noFill/>
-        </p:spPr>
-        <p:txBody>
-          <a:bodyPr>
-            <a:normAutofit/>
-          </a:bodyPr>
-          <a:lstStyle/>
-          <a:p>
-            <a:pPr algn="l"/>
-            <a:r>
-              <a:rPr lang="en-US" altLang="ko-KR" sz="2000" b="1" dirty="0">
-                <a:latin typeface="Helvetica Neue"/>
-              </a:rPr>
-              <a:t>Subscribers in weekday are three time more than weekend. </a:t>
-            </a:r>
-          </a:p>
-          <a:p>
-            <a:pPr algn="l"/>
-            <a:r>
-              <a:rPr lang="en-US" altLang="ko-KR" sz="2000" b="1" dirty="0">
-                <a:latin typeface="Helvetica Neue"/>
-              </a:rPr>
-              <a:t>Customers almost similar weekday and weekend.</a:t>
-            </a:r>
-          </a:p>
-        </p:txBody>
-      </p:sp>
       <p:sp>
         <p:nvSpPr>
           <p:cNvPr id="39" name="Rectangle 38">
@@ -6075,50 +5981,6 @@
           </a:fontRef>
         </p:style>
       </p:cxnSp>
-      <p:sp>
-        <p:nvSpPr>
-          <p:cNvPr id="7" name="TextBox 6">
-            <a:extLst>
-              <a:ext uri="{FF2B5EF4-FFF2-40B4-BE49-F238E27FC236}">
-                <a16:creationId xmlns:a16="http://schemas.microsoft.com/office/drawing/2014/main" id="{830CF99C-2EEC-4F72-B999-DC08C9295E22}"/>
-              </a:ext>
-            </a:extLst>
-          </p:cNvPr>
-          <p:cNvSpPr txBox="1"/>
-          <p:nvPr/>
-        </p:nvSpPr>
-        <p:spPr>
-          <a:xfrm>
-            <a:off x="4255362" y="5060632"/>
-            <a:ext cx="7463159" cy="1200329"/>
-          </a:xfrm>
-          <a:prstGeom prst="rect">
-            <a:avLst/>
-          </a:prstGeom>
-          <a:noFill/>
-        </p:spPr>
-        <p:txBody>
-          <a:bodyPr wrap="square">
-            <a:spAutoFit/>
-          </a:bodyPr>
-          <a:lstStyle/>
-          <a:p>
-            <a:r>
-              <a:rPr lang="en-US" altLang="ko-KR" dirty="0">
-                <a:solidFill>
-                  <a:schemeClr val="bg1"/>
-                </a:solidFill>
-              </a:rPr>
-              <a:t>Subscriber and Customer are the most sharply divided parts. Customer is the weekend, Subscribers are the most distributed during the week. Along with Hour, it can be seen as a feature that best describes the characteristics of the two user types.</a:t>
-            </a:r>
-            <a:endParaRPr lang="ko-KR" altLang="en-US" dirty="0">
-              <a:solidFill>
-                <a:schemeClr val="bg1"/>
-              </a:solidFill>
-            </a:endParaRPr>
-          </a:p>
-        </p:txBody>
-      </p:sp>
     </p:spTree>
     <p:extLst>
       <p:ext uri="{BB962C8B-B14F-4D97-AF65-F5344CB8AC3E}">
@@ -6715,7 +6577,7 @@
           <p:cNvPr id="2" name="TextBox 1">
             <a:extLst>
               <a:ext uri="{FF2B5EF4-FFF2-40B4-BE49-F238E27FC236}">
-                <a16:creationId xmlns:a16="http://schemas.microsoft.com/office/drawing/2014/main" id="{C7CB06D3-460A-47F2-978C-1F515D06354D}"/>
+                <a16:creationId xmlns:a16="http://schemas.microsoft.com/office/drawing/2014/main" id="{5689FEB6-179D-4006-893C-1CC1EFB157C9}"/>
               </a:ext>
             </a:extLst>
           </p:cNvPr>
@@ -6724,8 +6586,8 @@
         </p:nvSpPr>
         <p:spPr>
           <a:xfrm>
-            <a:off x="5175682" y="523783"/>
-            <a:ext cx="6516209" cy="646331"/>
+            <a:off x="5033639" y="168676"/>
+            <a:ext cx="5592932" cy="1477328"/>
           </a:xfrm>
           <a:prstGeom prst="rect">
             <a:avLst/>
@@ -6744,22 +6606,81 @@
             </a:pPr>
             <a:r>
               <a:rPr lang="en-US" altLang="ko-KR" dirty="0"/>
-              <a:t>Logistic Regression</a:t>
-            </a:r>
-          </a:p>
-          <a:p>
+              <a:t>Using Logistic Regression</a:t>
+            </a:r>
+          </a:p>
+          <a:p>
+            <a:pPr marL="285750" indent="-285750">
+              <a:buFont typeface="Arial" panose="020B0604020202020204" pitchFamily="34" charset="0"/>
+              <a:buChar char="•"/>
+            </a:pPr>
             <a:r>
               <a:rPr lang="en-US" altLang="ko-KR" dirty="0"/>
-              <a:t>    - </a:t>
-            </a:r>
-            <a:endParaRPr lang="ko-KR" altLang="en-US" dirty="0"/>
-          </a:p>
-        </p:txBody>
-      </p:sp>
+              <a:t>1,027,583 data and 15 features</a:t>
+            </a:r>
+          </a:p>
+          <a:p>
+            <a:pPr marL="285750" indent="-285750">
+              <a:buFont typeface="Arial" panose="020B0604020202020204" pitchFamily="34" charset="0"/>
+              <a:buChar char="•"/>
+            </a:pPr>
+            <a:r>
+              <a:rPr lang="en-US" altLang="ko-KR" dirty="0"/>
+              <a:t>Target Variable: User Type</a:t>
+            </a:r>
+          </a:p>
+          <a:p>
+            <a:r>
+              <a:rPr lang="en-US" altLang="ko-KR" dirty="0"/>
+              <a:t>    - Subscriber: 0, Customer: 1</a:t>
+            </a:r>
+          </a:p>
+          <a:p>
+            <a:pPr marL="285750" indent="-285750">
+              <a:buFont typeface="Arial" panose="020B0604020202020204" pitchFamily="34" charset="0"/>
+              <a:buChar char="•"/>
+            </a:pPr>
+            <a:r>
+              <a:rPr lang="en-US" altLang="ko-KR" dirty="0"/>
+              <a:t>All features</a:t>
+            </a:r>
+          </a:p>
+        </p:txBody>
+      </p:sp>
+      <p:pic>
+        <p:nvPicPr>
+          <p:cNvPr id="5" name="Picture 4">
+            <a:extLst>
+              <a:ext uri="{FF2B5EF4-FFF2-40B4-BE49-F238E27FC236}">
+                <a16:creationId xmlns:a16="http://schemas.microsoft.com/office/drawing/2014/main" id="{0953A0EA-B68B-49FD-B52D-E20D820DD59B}"/>
+              </a:ext>
+            </a:extLst>
+          </p:cNvPr>
+          <p:cNvPicPr>
+            <a:picLocks noChangeAspect="1"/>
+          </p:cNvPicPr>
+          <p:nvPr/>
+        </p:nvPicPr>
+        <p:blipFill>
+          <a:blip r:embed="rId2"/>
+          <a:stretch>
+            <a:fillRect/>
+          </a:stretch>
+        </p:blipFill>
+        <p:spPr>
+          <a:xfrm>
+            <a:off x="4842077" y="1753720"/>
+            <a:ext cx="7232134" cy="2822724"/>
+          </a:xfrm>
+          <a:prstGeom prst="rect">
+            <a:avLst/>
+          </a:prstGeom>
+        </p:spPr>
+      </p:pic>
     </p:spTree>
     <p:extLst>
       <p:ext uri="{BB962C8B-B14F-4D97-AF65-F5344CB8AC3E}">
-        <p14:creationId xmlns:p14="http://schemas.microsoft.com/office/powerpoint/2010/main" val="3971973679"/>
+        <p14:creationId xmlns:p14="http://schemas.microsoft.com/office/powerpoint/2010/main" val="2762909177"/>
       </p:ext>
     </p:extLst>
   </p:cSld>
@@ -7747,7 +7668,7 @@
                 <a:effectLst/>
                 <a:latin typeface="Helvetica Neue"/>
               </a:rPr>
-              <a:t>User Type Counts by</a:t>
+              <a:t>Confusion </a:t>
             </a:r>
           </a:p>
           <a:p>
@@ -7758,15 +7679,75 @@
                 </a:solidFill>
                 <a:latin typeface="Helvetica Neue"/>
               </a:rPr>
-              <a:t>User Type</a:t>
-            </a:r>
-          </a:p>
-        </p:txBody>
-      </p:sp>
+              <a:t>Matrix</a:t>
+            </a:r>
+          </a:p>
+        </p:txBody>
+      </p:sp>
+      <p:pic>
+        <p:nvPicPr>
+          <p:cNvPr id="7" name="Picture 6">
+            <a:extLst>
+              <a:ext uri="{FF2B5EF4-FFF2-40B4-BE49-F238E27FC236}">
+                <a16:creationId xmlns:a16="http://schemas.microsoft.com/office/drawing/2014/main" id="{0A3C7143-37A0-44E6-AD09-EDD3F9F2B642}"/>
+              </a:ext>
+            </a:extLst>
+          </p:cNvPr>
+          <p:cNvPicPr>
+            <a:picLocks noChangeAspect="1"/>
+          </p:cNvPicPr>
+          <p:nvPr/>
+        </p:nvPicPr>
+        <p:blipFill>
+          <a:blip r:embed="rId2"/>
+          <a:stretch>
+            <a:fillRect/>
+          </a:stretch>
+        </p:blipFill>
+        <p:spPr>
+          <a:xfrm>
+            <a:off x="5476875" y="2118369"/>
+            <a:ext cx="5287768" cy="4603899"/>
+          </a:xfrm>
+          <a:prstGeom prst="rect">
+            <a:avLst/>
+          </a:prstGeom>
+        </p:spPr>
+      </p:pic>
+      <p:pic>
+        <p:nvPicPr>
+          <p:cNvPr id="9" name="Picture 8">
+            <a:extLst>
+              <a:ext uri="{FF2B5EF4-FFF2-40B4-BE49-F238E27FC236}">
+                <a16:creationId xmlns:a16="http://schemas.microsoft.com/office/drawing/2014/main" id="{BEB891AC-47B0-43E6-A47D-552D86E08AB2}"/>
+              </a:ext>
+            </a:extLst>
+          </p:cNvPr>
+          <p:cNvPicPr>
+            <a:picLocks noChangeAspect="1"/>
+          </p:cNvPicPr>
+          <p:nvPr/>
+        </p:nvPicPr>
+        <p:blipFill>
+          <a:blip r:embed="rId3"/>
+          <a:stretch>
+            <a:fillRect/>
+          </a:stretch>
+        </p:blipFill>
+        <p:spPr>
+          <a:xfrm>
+            <a:off x="5476875" y="195510"/>
+            <a:ext cx="4800600" cy="1724025"/>
+          </a:xfrm>
+          <a:prstGeom prst="rect">
+            <a:avLst/>
+          </a:prstGeom>
+        </p:spPr>
+      </p:pic>
     </p:spTree>
     <p:extLst>
       <p:ext uri="{BB962C8B-B14F-4D97-AF65-F5344CB8AC3E}">
-        <p14:creationId xmlns:p14="http://schemas.microsoft.com/office/powerpoint/2010/main" val="2762909177"/>
+        <p14:creationId xmlns:p14="http://schemas.microsoft.com/office/powerpoint/2010/main" val="3118860794"/>
       </p:ext>
     </p:extLst>
   </p:cSld>
@@ -7777,271 +7758,6 @@
 </file>
 
 <file path=ppt/slides/slide21.xml><?xml version="1.0" encoding="utf-8"?>
-<p:sld xmlns:a="http://schemas.openxmlformats.org/drawingml/2006/main" xmlns:r="http://schemas.openxmlformats.org/officeDocument/2006/relationships" xmlns:p="http://schemas.openxmlformats.org/presentationml/2006/main">
-  <p:cSld>
-    <p:spTree>
-      <p:nvGrpSpPr>
-        <p:cNvPr id="1" name=""/>
-        <p:cNvGrpSpPr/>
-        <p:nvPr/>
-      </p:nvGrpSpPr>
-      <p:grpSpPr>
-        <a:xfrm>
-          <a:off x="0" y="0"/>
-          <a:ext cx="0" cy="0"/>
-          <a:chOff x="0" y="0"/>
-          <a:chExt cx="0" cy="0"/>
-        </a:xfrm>
-      </p:grpSpPr>
-      <p:sp>
-        <p:nvSpPr>
-          <p:cNvPr id="3" name="Subtitle 2">
-            <a:extLst>
-              <a:ext uri="{FF2B5EF4-FFF2-40B4-BE49-F238E27FC236}">
-                <a16:creationId xmlns:a16="http://schemas.microsoft.com/office/drawing/2014/main" id="{C63068C7-FF93-4F55-8D49-8E391F78232D}"/>
-              </a:ext>
-            </a:extLst>
-          </p:cNvPr>
-          <p:cNvSpPr>
-            <a:spLocks noGrp="1"/>
-          </p:cNvSpPr>
-          <p:nvPr>
-            <p:ph type="subTitle" idx="1"/>
-          </p:nvPr>
-        </p:nvSpPr>
-        <p:spPr>
-          <a:xfrm>
-            <a:off x="5572217" y="559293"/>
-            <a:ext cx="6314983" cy="5868139"/>
-          </a:xfrm>
-        </p:spPr>
-        <p:txBody>
-          <a:bodyPr>
-            <a:normAutofit/>
-          </a:bodyPr>
-          <a:lstStyle/>
-          <a:p>
-            <a:pPr algn="l"/>
-            <a:r>
-              <a:rPr lang="en-US" altLang="ko-KR" sz="3000" dirty="0">
-                <a:solidFill>
-                  <a:srgbClr val="00B0F0"/>
-                </a:solidFill>
-                <a:latin typeface="Arial Nova Light" panose="020B0304020202020204" pitchFamily="34" charset="0"/>
-                <a:cs typeface="Aldhabi" panose="020B0604020202020204" pitchFamily="2" charset="-78"/>
-              </a:rPr>
-              <a:t>Target Variable </a:t>
-            </a:r>
-          </a:p>
-          <a:p>
-            <a:pPr algn="l"/>
-            <a:r>
-              <a:rPr lang="en-US" altLang="ko-KR" sz="2000" dirty="0">
-                <a:latin typeface="Arial Nova Light" panose="020B0304020202020204" pitchFamily="34" charset="0"/>
-                <a:cs typeface="Aldhabi" panose="020B0604020202020204" pitchFamily="2" charset="-78"/>
-                <a:sym typeface="Wingdings" panose="05000000000000000000" pitchFamily="2" charset="2"/>
-              </a:rPr>
-              <a:t> </a:t>
-            </a:r>
-            <a:r>
-              <a:rPr lang="en-US" altLang="ko-KR" sz="2000" dirty="0">
-                <a:latin typeface="Arial Nova Light" panose="020B0304020202020204" pitchFamily="34" charset="0"/>
-                <a:cs typeface="Aldhabi" panose="020B0604020202020204" pitchFamily="2" charset="-78"/>
-              </a:rPr>
-              <a:t>start station checkout counts</a:t>
-            </a:r>
-          </a:p>
-          <a:p>
-            <a:pPr algn="l"/>
-            <a:endParaRPr lang="en-US" altLang="ko-KR" sz="3000" dirty="0">
-              <a:solidFill>
-                <a:srgbClr val="00B0F0"/>
-              </a:solidFill>
-              <a:latin typeface="Arial Nova Light" panose="020B0304020202020204" pitchFamily="34" charset="0"/>
-              <a:cs typeface="Aldhabi" panose="020B0604020202020204" pitchFamily="2" charset="-78"/>
-            </a:endParaRPr>
-          </a:p>
-          <a:p>
-            <a:pPr algn="l"/>
-            <a:r>
-              <a:rPr lang="en-US" altLang="ko-KR" sz="3000" dirty="0">
-                <a:solidFill>
-                  <a:srgbClr val="00B0F0"/>
-                </a:solidFill>
-                <a:latin typeface="Arial Nova Light" panose="020B0304020202020204" pitchFamily="34" charset="0"/>
-                <a:cs typeface="Aldhabi" panose="020B0604020202020204" pitchFamily="2" charset="-78"/>
-              </a:rPr>
-              <a:t>Multiple Linear Regression, Ridge</a:t>
-            </a:r>
-            <a:endParaRPr lang="ko-KR" altLang="en-US" sz="3000" dirty="0">
-              <a:solidFill>
-                <a:srgbClr val="00B0F0"/>
-              </a:solidFill>
-              <a:latin typeface="Arial Nova Light" panose="020B0304020202020204" pitchFamily="34" charset="0"/>
-              <a:cs typeface="Aldhabi" panose="020B0604020202020204" pitchFamily="2" charset="-78"/>
-            </a:endParaRPr>
-          </a:p>
-          <a:p>
-            <a:pPr algn="l"/>
-            <a:endParaRPr lang="en-US" altLang="ko-KR" sz="3000" dirty="0">
-              <a:solidFill>
-                <a:srgbClr val="00B0F0"/>
-              </a:solidFill>
-              <a:latin typeface="Arial Nova Light" panose="020B0304020202020204" pitchFamily="34" charset="0"/>
-              <a:cs typeface="Aldhabi" panose="020B0604020202020204" pitchFamily="2" charset="-78"/>
-            </a:endParaRPr>
-          </a:p>
-          <a:p>
-            <a:pPr algn="l"/>
-            <a:r>
-              <a:rPr lang="en-US" altLang="ko-KR" sz="2000" dirty="0">
-                <a:latin typeface="Arial Nova Light" panose="020B0304020202020204" pitchFamily="34" charset="0"/>
-                <a:cs typeface="Aldhabi" panose="020B0604020202020204" pitchFamily="2" charset="-78"/>
-                <a:sym typeface="Wingdings" panose="05000000000000000000" pitchFamily="2" charset="2"/>
-              </a:rPr>
-              <a:t></a:t>
-            </a:r>
-            <a:r>
-              <a:rPr lang="en-US" altLang="ko-KR" sz="2000" dirty="0">
-                <a:solidFill>
-                  <a:srgbClr val="00B0F0"/>
-                </a:solidFill>
-                <a:latin typeface="Arial Nova Light" panose="020B0304020202020204" pitchFamily="34" charset="0"/>
-                <a:cs typeface="Aldhabi" panose="020B0604020202020204" pitchFamily="2" charset="-78"/>
-                <a:sym typeface="Wingdings" panose="05000000000000000000" pitchFamily="2" charset="2"/>
-              </a:rPr>
-              <a:t> </a:t>
-            </a:r>
-            <a:r>
-              <a:rPr lang="en-US" altLang="ko-KR" sz="2000" dirty="0">
-                <a:latin typeface="Arial Nova Light" panose="020B0304020202020204" pitchFamily="34" charset="0"/>
-                <a:cs typeface="Aldhabi" panose="020B0604020202020204" pitchFamily="2" charset="-78"/>
-                <a:sym typeface="Wingdings" panose="05000000000000000000" pitchFamily="2" charset="2"/>
-              </a:rPr>
-              <a:t>Model Accuracy: 77.97 % on test data</a:t>
-            </a:r>
-            <a:endParaRPr lang="en-US" altLang="ko-KR" sz="2000" dirty="0">
-              <a:latin typeface="Arial Nova Light" panose="020B0304020202020204" pitchFamily="34" charset="0"/>
-              <a:cs typeface="Aldhabi" panose="020B0604020202020204" pitchFamily="2" charset="-78"/>
-            </a:endParaRPr>
-          </a:p>
-          <a:p>
-            <a:pPr algn="l"/>
-            <a:endParaRPr lang="en-US" altLang="ko-KR" sz="2000" dirty="0">
-              <a:latin typeface="Arial Nova Light" panose="020B0304020202020204" pitchFamily="34" charset="0"/>
-              <a:cs typeface="Aldhabi" panose="020B0604020202020204" pitchFamily="2" charset="-78"/>
-            </a:endParaRPr>
-          </a:p>
-        </p:txBody>
-      </p:sp>
-      <p:pic>
-        <p:nvPicPr>
-          <p:cNvPr id="1026" name="Picture 2">
-            <a:extLst>
-              <a:ext uri="{FF2B5EF4-FFF2-40B4-BE49-F238E27FC236}">
-                <a16:creationId xmlns:a16="http://schemas.microsoft.com/office/drawing/2014/main" id="{8DDE9F19-81C7-4DAD-BFF3-98A852243BDB}"/>
-              </a:ext>
-            </a:extLst>
-          </p:cNvPr>
-          <p:cNvPicPr>
-            <a:picLocks noChangeAspect="1" noChangeArrowheads="1" noCrop="1"/>
-          </p:cNvPicPr>
-          <p:nvPr/>
-        </p:nvPicPr>
-        <p:blipFill>
-          <a:blip r:embed="rId2">
-            <a:extLst>
-              <a:ext uri="{28A0092B-C50C-407E-A947-70E740481C1C}">
-                <a14:useLocalDpi xmlns:a14="http://schemas.microsoft.com/office/drawing/2010/main" val="0"/>
-              </a:ext>
-            </a:extLst>
-          </a:blip>
-          <a:srcRect/>
-          <a:stretch>
-            <a:fillRect/>
-          </a:stretch>
-        </p:blipFill>
-        <p:spPr bwMode="auto">
-          <a:xfrm>
-            <a:off x="0" y="0"/>
-            <a:ext cx="5129785" cy="3403031"/>
-          </a:xfrm>
-          <a:prstGeom prst="rect">
-            <a:avLst/>
-          </a:prstGeom>
-          <a:noFill/>
-          <a:extLst>
-            <a:ext uri="{909E8E84-426E-40DD-AFC4-6F175D3DCCD1}">
-              <a14:hiddenFill xmlns:a14="http://schemas.microsoft.com/office/drawing/2010/main">
-                <a:solidFill>
-                  <a:srgbClr val="FFFFFF"/>
-                </a:solidFill>
-              </a14:hiddenFill>
-            </a:ext>
-          </a:extLst>
-        </p:spPr>
-      </p:pic>
-      <p:pic>
-        <p:nvPicPr>
-          <p:cNvPr id="1028" name="Picture 4">
-            <a:extLst>
-              <a:ext uri="{FF2B5EF4-FFF2-40B4-BE49-F238E27FC236}">
-                <a16:creationId xmlns:a16="http://schemas.microsoft.com/office/drawing/2014/main" id="{213B05CB-2AA5-46A2-ABAF-6235DCF51190}"/>
-              </a:ext>
-            </a:extLst>
-          </p:cNvPr>
-          <p:cNvPicPr>
-            <a:picLocks noChangeAspect="1" noChangeArrowheads="1"/>
-          </p:cNvPicPr>
-          <p:nvPr/>
-        </p:nvPicPr>
-        <p:blipFill>
-          <a:blip r:embed="rId3">
-            <a:extLst>
-              <a:ext uri="{28A0092B-C50C-407E-A947-70E740481C1C}">
-                <a14:useLocalDpi xmlns:a14="http://schemas.microsoft.com/office/drawing/2010/main" val="0"/>
-              </a:ext>
-            </a:extLst>
-          </a:blip>
-          <a:srcRect/>
-          <a:stretch>
-            <a:fillRect/>
-          </a:stretch>
-        </p:blipFill>
-        <p:spPr bwMode="auto">
-          <a:xfrm>
-            <a:off x="0" y="3406904"/>
-            <a:ext cx="5129784" cy="3451289"/>
-          </a:xfrm>
-          <a:prstGeom prst="rect">
-            <a:avLst/>
-          </a:prstGeom>
-          <a:noFill/>
-          <a:extLst>
-            <a:ext uri="{909E8E84-426E-40DD-AFC4-6F175D3DCCD1}">
-              <a14:hiddenFill xmlns:a14="http://schemas.microsoft.com/office/drawing/2010/main">
-                <a:solidFill>
-                  <a:srgbClr val="FFFFFF"/>
-                </a:solidFill>
-              </a14:hiddenFill>
-            </a:ext>
-          </a:extLst>
-        </p:spPr>
-      </p:pic>
-    </p:spTree>
-    <p:extLst>
-      <p:ext uri="{BB962C8B-B14F-4D97-AF65-F5344CB8AC3E}">
-        <p14:creationId xmlns:p14="http://schemas.microsoft.com/office/powerpoint/2010/main" val="3446981779"/>
-      </p:ext>
-    </p:extLst>
-  </p:cSld>
-  <p:clrMapOvr>
-    <a:masterClrMapping/>
-  </p:clrMapOvr>
-</p:sld>
-</file>
-
-<file path=ppt/slides/slide22.xml><?xml version="1.0" encoding="utf-8"?>
 <p:sld xmlns:a="http://schemas.openxmlformats.org/drawingml/2006/main" xmlns:r="http://schemas.openxmlformats.org/officeDocument/2006/relationships" xmlns:p="http://schemas.openxmlformats.org/presentationml/2006/main">
   <p:cSld>
     <p:bg>
@@ -8068,7 +7784,7 @@
       </p:grpSpPr>
       <p:sp>
         <p:nvSpPr>
-          <p:cNvPr id="9" name="Rectangle 8">
+          <p:cNvPr id="19" name="Rectangle 18">
             <a:extLst>
               <a:ext uri="{FF2B5EF4-FFF2-40B4-BE49-F238E27FC236}">
                 <a16:creationId xmlns:a16="http://schemas.microsoft.com/office/drawing/2014/main" id="{605494DE-B078-4D87-BB01-C84320618DAD}"/>
@@ -8131,7 +7847,7 @@
       </p:sp>
       <p:sp>
         <p:nvSpPr>
-          <p:cNvPr id="11" name="Rectangle 10">
+          <p:cNvPr id="21" name="Rectangle 20">
             <a:extLst>
               <a:ext uri="{FF2B5EF4-FFF2-40B4-BE49-F238E27FC236}">
                 <a16:creationId xmlns:a16="http://schemas.microsoft.com/office/drawing/2014/main" id="{9A0576B0-CD8C-4661-95C8-A9F2CE7CDDB0}"/>
@@ -8196,7 +7912,7 @@
       </p:sp>
       <p:sp>
         <p:nvSpPr>
-          <p:cNvPr id="13" name="Freeform: Shape 12">
+          <p:cNvPr id="23" name="Freeform: Shape 22">
             <a:extLst>
               <a:ext uri="{FF2B5EF4-FFF2-40B4-BE49-F238E27FC236}">
                 <a16:creationId xmlns:a16="http://schemas.microsoft.com/office/drawing/2014/main" id="{3FF60E2B-3919-423C-B1FF-56CDE6681165}"/>
@@ -8322,108 +8038,149 @@
         </p:nvSpPr>
         <p:spPr>
           <a:xfrm>
-            <a:off x="104775" y="2687638"/>
-            <a:ext cx="4495799" cy="1655762"/>
+            <a:off x="0" y="2274908"/>
+            <a:ext cx="4724288" cy="2301536"/>
           </a:xfrm>
         </p:spPr>
         <p:txBody>
           <a:bodyPr>
-            <a:normAutofit fontScale="92500" lnSpcReduction="10000"/>
+            <a:normAutofit/>
           </a:bodyPr>
           <a:lstStyle/>
           <a:p>
-            <a:pPr algn="l"/>
-            <a:r>
-              <a:rPr lang="ko-KR" altLang="en-US" sz="2000" dirty="0">
+            <a:r>
+              <a:rPr lang="en-US" altLang="ko-KR" sz="3000" b="1" i="0" dirty="0">
                 <a:solidFill>
                   <a:schemeClr val="bg1"/>
                 </a:solidFill>
-                <a:latin typeface="Arial Nova Light" panose="020B0304020202020204" pitchFamily="34" charset="0"/>
-                <a:cs typeface="Aldhabi" panose="020B0604020202020204" pitchFamily="2" charset="-78"/>
-                <a:sym typeface="Wingdings" panose="05000000000000000000" pitchFamily="2" charset="2"/>
+                <a:effectLst/>
+                <a:latin typeface="Helvetica Neue"/>
               </a:rPr>
-              <a:t></a:t>
-            </a:r>
-            <a:r>
-              <a:rPr lang="en-US" altLang="ko-KR" sz="3000" dirty="0">
+              <a:t>Machine</a:t>
+            </a:r>
+          </a:p>
+          <a:p>
+            <a:r>
+              <a:rPr lang="en-US" altLang="ko-KR" sz="3000" b="1" dirty="0">
                 <a:solidFill>
                   <a:schemeClr val="bg1"/>
                 </a:solidFill>
-                <a:latin typeface="Arial Nova Light" panose="020B0304020202020204" pitchFamily="34" charset="0"/>
-                <a:cs typeface="Aldhabi" panose="020B0604020202020204" pitchFamily="2" charset="-78"/>
-                <a:sym typeface="Wingdings" panose="05000000000000000000" pitchFamily="2" charset="2"/>
+                <a:latin typeface="Helvetica Neue"/>
               </a:rPr>
-              <a:t>Feature Importance</a:t>
-            </a:r>
-          </a:p>
-          <a:p>
-            <a:pPr marL="342900" indent="-342900" algn="l">
-              <a:buFontTx/>
-              <a:buChar char="-"/>
+              <a:t>Learning</a:t>
+            </a:r>
+          </a:p>
+        </p:txBody>
+      </p:sp>
+      <p:sp>
+        <p:nvSpPr>
+          <p:cNvPr id="5" name="TextBox 4">
+            <a:extLst>
+              <a:ext uri="{FF2B5EF4-FFF2-40B4-BE49-F238E27FC236}">
+                <a16:creationId xmlns:a16="http://schemas.microsoft.com/office/drawing/2014/main" id="{83BCC192-57BF-4A6A-AFE4-B8B5FEB26397}"/>
+              </a:ext>
+            </a:extLst>
+          </p:cNvPr>
+          <p:cNvSpPr txBox="1"/>
+          <p:nvPr/>
+        </p:nvSpPr>
+        <p:spPr>
+          <a:xfrm>
+            <a:off x="5124450" y="479316"/>
+            <a:ext cx="6505575" cy="3139321"/>
+          </a:xfrm>
+          <a:prstGeom prst="rect">
+            <a:avLst/>
+          </a:prstGeom>
+          <a:noFill/>
+        </p:spPr>
+        <p:txBody>
+          <a:bodyPr wrap="square" rtlCol="0">
+            <a:spAutoFit/>
+          </a:bodyPr>
+          <a:lstStyle/>
+          <a:p>
+            <a:pPr marL="285750" indent="-285750">
+              <a:buFont typeface="Arial" panose="020B0604020202020204" pitchFamily="34" charset="0"/>
+              <a:buChar char="•"/>
             </a:pPr>
             <a:r>
-              <a:rPr lang="en-US" altLang="ko-KR" sz="2000" dirty="0">
-                <a:solidFill>
-                  <a:schemeClr val="bg1"/>
-                </a:solidFill>
-                <a:latin typeface="Arial Nova Light" panose="020B0304020202020204" pitchFamily="34" charset="0"/>
-                <a:cs typeface="Aldhabi" panose="020B0604020202020204" pitchFamily="2" charset="-78"/>
-                <a:sym typeface="Wingdings" panose="05000000000000000000" pitchFamily="2" charset="2"/>
-              </a:rPr>
-              <a:t>Start hour is excessively biased</a:t>
-            </a:r>
-          </a:p>
-          <a:p>
-            <a:pPr algn="l"/>
-            <a:endParaRPr lang="en-US" altLang="ko-KR" sz="2000" dirty="0">
-              <a:solidFill>
-                <a:schemeClr val="bg1"/>
-              </a:solidFill>
-              <a:latin typeface="Arial Nova Light" panose="020B0304020202020204" pitchFamily="34" charset="0"/>
-              <a:cs typeface="Aldhabi" panose="020B0604020202020204" pitchFamily="2" charset="-78"/>
-              <a:sym typeface="Wingdings" panose="05000000000000000000" pitchFamily="2" charset="2"/>
-            </a:endParaRPr>
-          </a:p>
-          <a:p>
-            <a:pPr algn="l"/>
-            <a:r>
-              <a:rPr lang="en-US" altLang="ko-KR" sz="2000" dirty="0">
-                <a:solidFill>
-                  <a:schemeClr val="bg1"/>
-                </a:solidFill>
-                <a:latin typeface="Arial Nova Light" panose="020B0304020202020204" pitchFamily="34" charset="0"/>
-                <a:cs typeface="Aldhabi" panose="020B0604020202020204" pitchFamily="2" charset="-78"/>
-                <a:sym typeface="Wingdings" panose="05000000000000000000" pitchFamily="2" charset="2"/>
-              </a:rPr>
-              <a:t> </a:t>
-            </a:r>
-            <a:r>
-              <a:rPr lang="en-US" altLang="ko-KR" sz="3000" dirty="0">
-                <a:solidFill>
-                  <a:schemeClr val="bg1"/>
-                </a:solidFill>
-                <a:latin typeface="Arial Nova Light" panose="020B0304020202020204" pitchFamily="34" charset="0"/>
-                <a:cs typeface="Aldhabi" panose="020B0604020202020204" pitchFamily="2" charset="-78"/>
-                <a:sym typeface="Wingdings" panose="05000000000000000000" pitchFamily="2" charset="2"/>
-              </a:rPr>
-              <a:t>Test data 82.4 %</a:t>
-            </a:r>
-            <a:endParaRPr lang="ko-KR" altLang="en-US" sz="3000" dirty="0">
-              <a:solidFill>
-                <a:schemeClr val="bg1"/>
-              </a:solidFill>
-              <a:latin typeface="Arial Nova Light" panose="020B0304020202020204" pitchFamily="34" charset="0"/>
-              <a:cs typeface="Aldhabi" panose="020B0604020202020204" pitchFamily="2" charset="-78"/>
-            </a:endParaRPr>
+              <a:rPr lang="en-US" altLang="ko-KR" dirty="0"/>
+              <a:t>First score:</a:t>
+            </a:r>
+          </a:p>
+          <a:p>
+            <a:r>
+              <a:rPr lang="en-US" altLang="ko-KR" dirty="0"/>
+              <a:t>    - Test Accuracy: 0.77776</a:t>
+            </a:r>
+          </a:p>
+          <a:p>
+            <a:endParaRPr lang="en-US" altLang="ko-KR" dirty="0"/>
+          </a:p>
+          <a:p>
+            <a:pPr marL="285750" indent="-285750">
+              <a:buFont typeface="Arial" panose="020B0604020202020204" pitchFamily="34" charset="0"/>
+              <a:buChar char="•"/>
+            </a:pPr>
+            <a:r>
+              <a:rPr lang="en-US" altLang="ko-KR" dirty="0"/>
+              <a:t>Dummy Classifier:</a:t>
+            </a:r>
+          </a:p>
+          <a:p>
+            <a:r>
+              <a:rPr lang="en-US" altLang="ko-KR" dirty="0"/>
+              <a:t>    - Test Accuracy: 0.85997</a:t>
+            </a:r>
+          </a:p>
+          <a:p>
+            <a:endParaRPr lang="en-US" altLang="ko-KR" dirty="0"/>
+          </a:p>
+          <a:p>
+            <a:pPr marL="285750" indent="-285750">
+              <a:buFont typeface="Arial" panose="020B0604020202020204" pitchFamily="34" charset="0"/>
+              <a:buChar char="•"/>
+            </a:pPr>
+            <a:r>
+              <a:rPr lang="en-US" altLang="ko-KR" dirty="0"/>
+              <a:t>Grid Search:</a:t>
+            </a:r>
+          </a:p>
+          <a:p>
+            <a:r>
+              <a:rPr lang="en-US" altLang="ko-KR" dirty="0"/>
+              <a:t>    - Test Accuracy: 0.86135</a:t>
+            </a:r>
+          </a:p>
+          <a:p>
+            <a:endParaRPr lang="en-US" altLang="ko-KR" dirty="0"/>
+          </a:p>
+          <a:p>
+            <a:pPr marL="285750" indent="-285750">
+              <a:buFont typeface="Arial" panose="020B0604020202020204" pitchFamily="34" charset="0"/>
+              <a:buChar char="•"/>
+            </a:pPr>
+            <a:r>
+              <a:rPr lang="en-US" altLang="ko-KR" dirty="0"/>
+              <a:t>Final Score (Log Loss):</a:t>
+            </a:r>
+          </a:p>
+          <a:p>
+            <a:r>
+              <a:rPr lang="en-US" altLang="ko-KR" dirty="0"/>
+              <a:t>    - Test Accuracy: 0.86564</a:t>
+            </a:r>
+            <a:endParaRPr lang="ko-KR" altLang="en-US" dirty="0"/>
           </a:p>
         </p:txBody>
       </p:sp>
       <p:pic>
         <p:nvPicPr>
-          <p:cNvPr id="4" name="Picture 3">
-            <a:extLst>
-              <a:ext uri="{FF2B5EF4-FFF2-40B4-BE49-F238E27FC236}">
-                <a16:creationId xmlns:a16="http://schemas.microsoft.com/office/drawing/2014/main" id="{48804F73-28E9-4977-8713-70258DE972D9}"/>
+          <p:cNvPr id="7" name="Picture 6">
+            <a:extLst>
+              <a:ext uri="{FF2B5EF4-FFF2-40B4-BE49-F238E27FC236}">
+                <a16:creationId xmlns:a16="http://schemas.microsoft.com/office/drawing/2014/main" id="{E44F0310-6664-48AB-8709-3685F594C600}"/>
               </a:ext>
             </a:extLst>
           </p:cNvPr>
@@ -8440,8 +8197,8 @@
         </p:blipFill>
         <p:spPr>
           <a:xfrm>
-            <a:off x="5320996" y="1083982"/>
-            <a:ext cx="6274296" cy="4690036"/>
+            <a:off x="8636214" y="469920"/>
+            <a:ext cx="3555786" cy="5178405"/>
           </a:xfrm>
           <a:prstGeom prst="rect">
             <a:avLst/>
@@ -8451,7 +8208,7 @@
     </p:spTree>
     <p:extLst>
       <p:ext uri="{BB962C8B-B14F-4D97-AF65-F5344CB8AC3E}">
-        <p14:creationId xmlns:p14="http://schemas.microsoft.com/office/powerpoint/2010/main" val="1414430633"/>
+        <p14:creationId xmlns:p14="http://schemas.microsoft.com/office/powerpoint/2010/main" val="1905000777"/>
       </p:ext>
     </p:extLst>
   </p:cSld>
@@ -8461,7 +8218,7 @@
 </p:sld>
 </file>
 
-<file path=ppt/slides/slide23.xml><?xml version="1.0" encoding="utf-8"?>
+<file path=ppt/slides/slide22.xml><?xml version="1.0" encoding="utf-8"?>
 <p:sld xmlns:a="http://schemas.openxmlformats.org/drawingml/2006/main" xmlns:r="http://schemas.openxmlformats.org/officeDocument/2006/relationships" xmlns:p="http://schemas.openxmlformats.org/presentationml/2006/main">
   <p:cSld>
     <p:bg>
@@ -8549,36 +8306,6 @@
           </a:p>
         </p:txBody>
       </p:sp>
-      <p:pic>
-        <p:nvPicPr>
-          <p:cNvPr id="4" name="Picture 3">
-            <a:extLst>
-              <a:ext uri="{FF2B5EF4-FFF2-40B4-BE49-F238E27FC236}">
-                <a16:creationId xmlns:a16="http://schemas.microsoft.com/office/drawing/2014/main" id="{B35A02A3-C9B3-4AEC-8594-A2C1F6FA1F8D}"/>
-              </a:ext>
-            </a:extLst>
-          </p:cNvPr>
-          <p:cNvPicPr>
-            <a:picLocks noChangeAspect="1"/>
-          </p:cNvPicPr>
-          <p:nvPr/>
-        </p:nvPicPr>
-        <p:blipFill>
-          <a:blip r:embed="rId2"/>
-          <a:stretch>
-            <a:fillRect/>
-          </a:stretch>
-        </p:blipFill>
-        <p:spPr>
-          <a:xfrm>
-            <a:off x="5848350" y="1303940"/>
-            <a:ext cx="5890683" cy="4403286"/>
-          </a:xfrm>
-          <a:prstGeom prst="rect">
-            <a:avLst/>
-          </a:prstGeom>
-        </p:spPr>
-      </p:pic>
       <p:sp>
         <p:nvSpPr>
           <p:cNvPr id="11" name="Freeform: Shape 10">
@@ -8910,519 +8637,6 @@
         </p:nvSpPr>
         <p:spPr>
           <a:xfrm>
-            <a:off x="0" y="1962150"/>
-            <a:ext cx="4514850" cy="2333625"/>
-          </a:xfrm>
-        </p:spPr>
-        <p:txBody>
-          <a:bodyPr anchor="t">
-            <a:normAutofit fontScale="92500" lnSpcReduction="10000"/>
-          </a:bodyPr>
-          <a:lstStyle/>
-          <a:p>
-            <a:pPr algn="l"/>
-            <a:r>
-              <a:rPr lang="ko-KR" altLang="en-US" sz="3000" dirty="0">
-                <a:latin typeface="Arial Nova Light" panose="020B0304020202020204" pitchFamily="34" charset="0"/>
-                <a:cs typeface="Aldhabi" panose="020B0604020202020204" pitchFamily="2" charset="-78"/>
-                <a:sym typeface="Wingdings" panose="05000000000000000000" pitchFamily="2" charset="2"/>
-              </a:rPr>
-              <a:t></a:t>
-            </a:r>
-            <a:r>
-              <a:rPr lang="en-US" altLang="ko-KR" sz="3000" dirty="0">
-                <a:latin typeface="Arial Nova Light" panose="020B0304020202020204" pitchFamily="34" charset="0"/>
-                <a:cs typeface="Aldhabi" panose="020B0604020202020204" pitchFamily="2" charset="-78"/>
-                <a:sym typeface="Wingdings" panose="05000000000000000000" pitchFamily="2" charset="2"/>
-              </a:rPr>
-              <a:t>Feature Importance</a:t>
-            </a:r>
-          </a:p>
-          <a:p>
-            <a:pPr marL="342900" indent="-342900" algn="l">
-              <a:buFontTx/>
-              <a:buChar char="-"/>
-            </a:pPr>
-            <a:r>
-              <a:rPr lang="en-US" altLang="ko-KR" sz="2000" dirty="0">
-                <a:latin typeface="Arial Nova Light" panose="020B0304020202020204" pitchFamily="34" charset="0"/>
-                <a:cs typeface="Aldhabi" panose="020B0604020202020204" pitchFamily="2" charset="-78"/>
-                <a:sym typeface="Wingdings" panose="05000000000000000000" pitchFamily="2" charset="2"/>
-              </a:rPr>
-              <a:t>Start hour is excessively biased as well</a:t>
-            </a:r>
-          </a:p>
-          <a:p>
-            <a:pPr algn="l"/>
-            <a:endParaRPr lang="en-US" altLang="ko-KR" sz="3000" dirty="0">
-              <a:latin typeface="Arial Nova Light" panose="020B0304020202020204" pitchFamily="34" charset="0"/>
-              <a:cs typeface="Aldhabi" panose="020B0604020202020204" pitchFamily="2" charset="-78"/>
-              <a:sym typeface="Wingdings" panose="05000000000000000000" pitchFamily="2" charset="2"/>
-            </a:endParaRPr>
-          </a:p>
-          <a:p>
-            <a:pPr marL="457200" indent="-457200" algn="l">
-              <a:buFont typeface="Wingdings" panose="05000000000000000000" pitchFamily="2" charset="2"/>
-              <a:buChar char=""/>
-            </a:pPr>
-            <a:r>
-              <a:rPr lang="en-US" altLang="ko-KR" sz="3000" dirty="0">
-                <a:latin typeface="Arial Nova Light" panose="020B0304020202020204" pitchFamily="34" charset="0"/>
-                <a:cs typeface="Aldhabi" panose="020B0604020202020204" pitchFamily="2" charset="-78"/>
-                <a:sym typeface="Wingdings" panose="05000000000000000000" pitchFamily="2" charset="2"/>
-              </a:rPr>
-              <a:t>Test data 84.0 %</a:t>
-            </a:r>
-          </a:p>
-          <a:p>
-            <a:pPr algn="l"/>
-            <a:r>
-              <a:rPr lang="en-US" altLang="ko-KR" sz="3000" dirty="0">
-                <a:latin typeface="Arial Nova Light" panose="020B0304020202020204" pitchFamily="34" charset="0"/>
-                <a:cs typeface="Aldhabi" panose="020B0604020202020204" pitchFamily="2" charset="-78"/>
-                <a:sym typeface="Wingdings" panose="05000000000000000000" pitchFamily="2" charset="2"/>
-              </a:rPr>
-              <a:t>     </a:t>
-            </a:r>
-            <a:endParaRPr lang="ko-KR" altLang="en-US" sz="2000" dirty="0">
-              <a:latin typeface="Arial Nova Light" panose="020B0304020202020204" pitchFamily="34" charset="0"/>
-              <a:cs typeface="Aldhabi" panose="020B0604020202020204" pitchFamily="2" charset="-78"/>
-            </a:endParaRPr>
-          </a:p>
-        </p:txBody>
-      </p:sp>
-    </p:spTree>
-    <p:extLst>
-      <p:ext uri="{BB962C8B-B14F-4D97-AF65-F5344CB8AC3E}">
-        <p14:creationId xmlns:p14="http://schemas.microsoft.com/office/powerpoint/2010/main" val="4275576414"/>
-      </p:ext>
-    </p:extLst>
-  </p:cSld>
-  <p:clrMapOvr>
-    <a:overrideClrMapping bg1="dk1" tx1="lt1" bg2="dk2" tx2="lt2" accent1="accent1" accent2="accent2" accent3="accent3" accent4="accent4" accent5="accent5" accent6="accent6" hlink="hlink" folHlink="folHlink"/>
-  </p:clrMapOvr>
-</p:sld>
-</file>
-
-<file path=ppt/slides/slide24.xml><?xml version="1.0" encoding="utf-8"?>
-<p:sld xmlns:a="http://schemas.openxmlformats.org/drawingml/2006/main" xmlns:r="http://schemas.openxmlformats.org/officeDocument/2006/relationships" xmlns:p="http://schemas.openxmlformats.org/presentationml/2006/main">
-  <p:cSld>
-    <p:bg>
-      <p:bgPr>
-        <a:solidFill>
-          <a:schemeClr val="bg1"/>
-        </a:solidFill>
-        <a:effectLst/>
-      </p:bgPr>
-    </p:bg>
-    <p:spTree>
-      <p:nvGrpSpPr>
-        <p:cNvPr id="1" name=""/>
-        <p:cNvGrpSpPr/>
-        <p:nvPr/>
-      </p:nvGrpSpPr>
-      <p:grpSpPr>
-        <a:xfrm>
-          <a:off x="0" y="0"/>
-          <a:ext cx="0" cy="0"/>
-          <a:chOff x="0" y="0"/>
-          <a:chExt cx="0" cy="0"/>
-        </a:xfrm>
-      </p:grpSpPr>
-      <p:sp>
-        <p:nvSpPr>
-          <p:cNvPr id="9" name="Rectangle 8">
-            <a:extLst>
-              <a:ext uri="{FF2B5EF4-FFF2-40B4-BE49-F238E27FC236}">
-                <a16:creationId xmlns:a16="http://schemas.microsoft.com/office/drawing/2014/main" id="{0DE6A193-4755-479A-BC6F-A7EBCA73BE1A}"/>
-              </a:ext>
-              <a:ext uri="{C183D7F6-B498-43B3-948B-1728B52AA6E4}">
-                <adec:decorative xmlns:adec="http://schemas.microsoft.com/office/drawing/2017/decorative" val="1"/>
-              </a:ext>
-            </a:extLst>
-          </p:cNvPr>
-          <p:cNvSpPr>
-            <a:spLocks noGrp="1" noRot="1" noChangeAspect="1" noMove="1" noResize="1" noEditPoints="1" noAdjustHandles="1" noChangeArrowheads="1" noChangeShapeType="1" noTextEdit="1"/>
-          </p:cNvSpPr>
-          <p:nvPr>
-            <p:extLst>
-              <p:ext uri="{386F3935-93C4-4BCD-93E2-E3B085C9AB24}">
-                <p16:designElem xmlns:p16="http://schemas.microsoft.com/office/powerpoint/2015/main" val="1"/>
-              </p:ext>
-            </p:extLst>
-          </p:nvPr>
-        </p:nvSpPr>
-        <p:spPr>
-          <a:xfrm>
-            <a:off x="0" y="0"/>
-            <a:ext cx="12192001" cy="6858000"/>
-          </a:xfrm>
-          <a:prstGeom prst="rect">
-            <a:avLst/>
-          </a:prstGeom>
-          <a:solidFill>
-            <a:schemeClr val="tx1"/>
-          </a:solidFill>
-          <a:ln>
-            <a:noFill/>
-          </a:ln>
-        </p:spPr>
-        <p:style>
-          <a:lnRef idx="2">
-            <a:schemeClr val="accent1">
-              <a:shade val="50000"/>
-            </a:schemeClr>
-          </a:lnRef>
-          <a:fillRef idx="1">
-            <a:schemeClr val="accent1"/>
-          </a:fillRef>
-          <a:effectRef idx="0">
-            <a:schemeClr val="accent1"/>
-          </a:effectRef>
-          <a:fontRef idx="minor">
-            <a:schemeClr val="lt1"/>
-          </a:fontRef>
-        </p:style>
-        <p:txBody>
-          <a:bodyPr rtlCol="0" anchor="ctr"/>
-          <a:lstStyle/>
-          <a:p>
-            <a:pPr algn="ctr"/>
-            <a:endParaRPr lang="en-US"/>
-          </a:p>
-        </p:txBody>
-      </p:sp>
-      <p:sp>
-        <p:nvSpPr>
-          <p:cNvPr id="11" name="Freeform: Shape 10">
-            <a:extLst>
-              <a:ext uri="{FF2B5EF4-FFF2-40B4-BE49-F238E27FC236}">
-                <a16:creationId xmlns:a16="http://schemas.microsoft.com/office/drawing/2014/main" id="{5A55B759-31A7-423C-9BC2-A8BC09FE98B9}"/>
-              </a:ext>
-              <a:ext uri="{C183D7F6-B498-43B3-948B-1728B52AA6E4}">
-                <adec:decorative xmlns:adec="http://schemas.microsoft.com/office/drawing/2017/decorative" val="1"/>
-              </a:ext>
-            </a:extLst>
-          </p:cNvPr>
-          <p:cNvSpPr>
-            <a:spLocks noGrp="1" noRot="1" noChangeAspect="1" noMove="1" noResize="1" noEditPoints="1" noAdjustHandles="1" noChangeArrowheads="1" noChangeShapeType="1" noTextEdit="1"/>
-          </p:cNvSpPr>
-          <p:nvPr>
-            <p:extLst>
-              <p:ext uri="{386F3935-93C4-4BCD-93E2-E3B085C9AB24}">
-                <p16:designElem xmlns:p16="http://schemas.microsoft.com/office/powerpoint/2015/main" val="1"/>
-              </p:ext>
-            </p:extLst>
-          </p:nvPr>
-        </p:nvSpPr>
-        <p:spPr>
-          <a:xfrm flipV="1">
-            <a:off x="0" y="-478"/>
-            <a:ext cx="6754318" cy="6858478"/>
-          </a:xfrm>
-          <a:custGeom>
-            <a:avLst/>
-            <a:gdLst>
-              <a:gd name="connsiteX0" fmla="*/ 0 w 6754318"/>
-              <a:gd name="connsiteY0" fmla="*/ 6858478 h 6858478"/>
-              <a:gd name="connsiteX1" fmla="*/ 6754318 w 6754318"/>
-              <a:gd name="connsiteY1" fmla="*/ 6858478 h 6858478"/>
-              <a:gd name="connsiteX2" fmla="*/ 3577943 w 6754318"/>
-              <a:gd name="connsiteY2" fmla="*/ 0 h 6858478"/>
-              <a:gd name="connsiteX3" fmla="*/ 3572366 w 6754318"/>
-              <a:gd name="connsiteY3" fmla="*/ 0 h 6858478"/>
-              <a:gd name="connsiteX4" fmla="*/ 2506138 w 6754318"/>
-              <a:gd name="connsiteY4" fmla="*/ 0 h 6858478"/>
-              <a:gd name="connsiteX5" fmla="*/ 0 w 6754318"/>
-              <a:gd name="connsiteY5" fmla="*/ 0 h 6858478"/>
-            </a:gdLst>
-            <a:ahLst/>
-            <a:cxnLst>
-              <a:cxn ang="0">
-                <a:pos x="connsiteX0" y="connsiteY0"/>
-              </a:cxn>
-              <a:cxn ang="0">
-                <a:pos x="connsiteX1" y="connsiteY1"/>
-              </a:cxn>
-              <a:cxn ang="0">
-                <a:pos x="connsiteX2" y="connsiteY2"/>
-              </a:cxn>
-              <a:cxn ang="0">
-                <a:pos x="connsiteX3" y="connsiteY3"/>
-              </a:cxn>
-              <a:cxn ang="0">
-                <a:pos x="connsiteX4" y="connsiteY4"/>
-              </a:cxn>
-              <a:cxn ang="0">
-                <a:pos x="connsiteX5" y="connsiteY5"/>
-              </a:cxn>
-            </a:cxnLst>
-            <a:rect l="l" t="t" r="r" b="b"/>
-            <a:pathLst>
-              <a:path w="6754318" h="6858478">
-                <a:moveTo>
-                  <a:pt x="0" y="6858478"/>
-                </a:moveTo>
-                <a:lnTo>
-                  <a:pt x="6754318" y="6858478"/>
-                </a:lnTo>
-                <a:lnTo>
-                  <a:pt x="3577943" y="0"/>
-                </a:lnTo>
-                <a:lnTo>
-                  <a:pt x="3572366" y="0"/>
-                </a:lnTo>
-                <a:lnTo>
-                  <a:pt x="2506138" y="0"/>
-                </a:lnTo>
-                <a:lnTo>
-                  <a:pt x="0" y="0"/>
-                </a:lnTo>
-                <a:close/>
-              </a:path>
-            </a:pathLst>
-          </a:custGeom>
-          <a:solidFill>
-            <a:schemeClr val="bg1">
-              <a:lumMod val="85000"/>
-              <a:lumOff val="15000"/>
-              <a:alpha val="70000"/>
-            </a:schemeClr>
-          </a:solidFill>
-          <a:ln>
-            <a:noFill/>
-          </a:ln>
-        </p:spPr>
-        <p:style>
-          <a:lnRef idx="2">
-            <a:schemeClr val="accent1">
-              <a:shade val="50000"/>
-            </a:schemeClr>
-          </a:lnRef>
-          <a:fillRef idx="1">
-            <a:schemeClr val="accent1"/>
-          </a:fillRef>
-          <a:effectRef idx="0">
-            <a:schemeClr val="accent1"/>
-          </a:effectRef>
-          <a:fontRef idx="minor">
-            <a:schemeClr val="lt1"/>
-          </a:fontRef>
-        </p:style>
-        <p:txBody>
-          <a:bodyPr wrap="square" rtlCol="0" anchor="ctr">
-            <a:noAutofit/>
-          </a:bodyPr>
-          <a:lstStyle/>
-          <a:p>
-            <a:pPr marL="0" marR="0" lvl="0" indent="0" algn="ctr" defTabSz="914400" rtl="0" eaLnBrk="1" fontAlgn="auto" latinLnBrk="0" hangingPunct="1">
-              <a:lnSpc>
-                <a:spcPct val="100000"/>
-              </a:lnSpc>
-              <a:spcBef>
-                <a:spcPts val="0"/>
-              </a:spcBef>
-              <a:spcAft>
-                <a:spcPts val="0"/>
-              </a:spcAft>
-              <a:buClrTx/>
-              <a:buSzTx/>
-              <a:buFontTx/>
-              <a:buNone/>
-              <a:tabLst/>
-              <a:defRPr/>
-            </a:pPr>
-            <a:endParaRPr kumimoji="0" lang="en-US" sz="1800" b="0" i="0" u="none" strike="noStrike" kern="1200" cap="none" spc="0" normalizeH="0" baseline="0" noProof="0">
-              <a:ln>
-                <a:noFill/>
-              </a:ln>
-              <a:solidFill>
-                <a:prstClr val="white"/>
-              </a:solidFill>
-              <a:effectLst/>
-              <a:uLnTx/>
-              <a:uFillTx/>
-              <a:latin typeface="Calibri" panose="020F0502020204030204"/>
-              <a:ea typeface="+mn-ea"/>
-              <a:cs typeface="+mn-cs"/>
-            </a:endParaRPr>
-          </a:p>
-        </p:txBody>
-      </p:sp>
-      <p:sp>
-        <p:nvSpPr>
-          <p:cNvPr id="13" name="Freeform: Shape 12">
-            <a:extLst>
-              <a:ext uri="{FF2B5EF4-FFF2-40B4-BE49-F238E27FC236}">
-                <a16:creationId xmlns:a16="http://schemas.microsoft.com/office/drawing/2014/main" id="{F78796AF-79A0-47AC-BEFD-BFFC00F968C4}"/>
-              </a:ext>
-              <a:ext uri="{C183D7F6-B498-43B3-948B-1728B52AA6E4}">
-                <adec:decorative xmlns:adec="http://schemas.microsoft.com/office/drawing/2017/decorative" val="1"/>
-              </a:ext>
-            </a:extLst>
-          </p:cNvPr>
-          <p:cNvSpPr>
-            <a:spLocks noGrp="1" noRot="1" noChangeAspect="1" noMove="1" noResize="1" noEditPoints="1" noAdjustHandles="1" noChangeArrowheads="1" noChangeShapeType="1" noTextEdit="1"/>
-          </p:cNvSpPr>
-          <p:nvPr>
-            <p:extLst>
-              <p:ext uri="{386F3935-93C4-4BCD-93E2-E3B085C9AB24}">
-                <p16:designElem xmlns:p16="http://schemas.microsoft.com/office/powerpoint/2015/main" val="1"/>
-              </p:ext>
-            </p:extLst>
-          </p:nvPr>
-        </p:nvSpPr>
-        <p:spPr>
-          <a:xfrm flipV="1">
-            <a:off x="1" y="-478"/>
-            <a:ext cx="5953780" cy="6858478"/>
-          </a:xfrm>
-          <a:custGeom>
-            <a:avLst/>
-            <a:gdLst>
-              <a:gd name="connsiteX0" fmla="*/ 0 w 5953780"/>
-              <a:gd name="connsiteY0" fmla="*/ 6858478 h 6858478"/>
-              <a:gd name="connsiteX1" fmla="*/ 5953780 w 5953780"/>
-              <a:gd name="connsiteY1" fmla="*/ 6858478 h 6858478"/>
-              <a:gd name="connsiteX2" fmla="*/ 2777405 w 5953780"/>
-              <a:gd name="connsiteY2" fmla="*/ 0 h 6858478"/>
-              <a:gd name="connsiteX3" fmla="*/ 2771828 w 5953780"/>
-              <a:gd name="connsiteY3" fmla="*/ 0 h 6858478"/>
-              <a:gd name="connsiteX4" fmla="*/ 1705600 w 5953780"/>
-              <a:gd name="connsiteY4" fmla="*/ 0 h 6858478"/>
-              <a:gd name="connsiteX5" fmla="*/ 0 w 5953780"/>
-              <a:gd name="connsiteY5" fmla="*/ 0 h 6858478"/>
-            </a:gdLst>
-            <a:ahLst/>
-            <a:cxnLst>
-              <a:cxn ang="0">
-                <a:pos x="connsiteX0" y="connsiteY0"/>
-              </a:cxn>
-              <a:cxn ang="0">
-                <a:pos x="connsiteX1" y="connsiteY1"/>
-              </a:cxn>
-              <a:cxn ang="0">
-                <a:pos x="connsiteX2" y="connsiteY2"/>
-              </a:cxn>
-              <a:cxn ang="0">
-                <a:pos x="connsiteX3" y="connsiteY3"/>
-              </a:cxn>
-              <a:cxn ang="0">
-                <a:pos x="connsiteX4" y="connsiteY4"/>
-              </a:cxn>
-              <a:cxn ang="0">
-                <a:pos x="connsiteX5" y="connsiteY5"/>
-              </a:cxn>
-            </a:cxnLst>
-            <a:rect l="l" t="t" r="r" b="b"/>
-            <a:pathLst>
-              <a:path w="5953780" h="6858478">
-                <a:moveTo>
-                  <a:pt x="0" y="6858478"/>
-                </a:moveTo>
-                <a:lnTo>
-                  <a:pt x="5953780" y="6858478"/>
-                </a:lnTo>
-                <a:lnTo>
-                  <a:pt x="2777405" y="0"/>
-                </a:lnTo>
-                <a:lnTo>
-                  <a:pt x="2771828" y="0"/>
-                </a:lnTo>
-                <a:lnTo>
-                  <a:pt x="1705600" y="0"/>
-                </a:lnTo>
-                <a:lnTo>
-                  <a:pt x="0" y="0"/>
-                </a:lnTo>
-                <a:close/>
-              </a:path>
-            </a:pathLst>
-          </a:custGeom>
-          <a:solidFill>
-            <a:schemeClr val="bg1">
-              <a:lumMod val="85000"/>
-              <a:lumOff val="15000"/>
-            </a:schemeClr>
-          </a:solidFill>
-          <a:ln>
-            <a:noFill/>
-          </a:ln>
-        </p:spPr>
-        <p:style>
-          <a:lnRef idx="2">
-            <a:schemeClr val="accent1">
-              <a:shade val="50000"/>
-            </a:schemeClr>
-          </a:lnRef>
-          <a:fillRef idx="1">
-            <a:schemeClr val="accent1"/>
-          </a:fillRef>
-          <a:effectRef idx="0">
-            <a:schemeClr val="accent1"/>
-          </a:effectRef>
-          <a:fontRef idx="minor">
-            <a:schemeClr val="lt1"/>
-          </a:fontRef>
-        </p:style>
-        <p:txBody>
-          <a:bodyPr wrap="square" rtlCol="0" anchor="ctr">
-            <a:noAutofit/>
-          </a:bodyPr>
-          <a:lstStyle/>
-          <a:p>
-            <a:pPr marL="0" marR="0" lvl="0" indent="0" algn="ctr" defTabSz="914400" rtl="0" eaLnBrk="1" fontAlgn="auto" latinLnBrk="0" hangingPunct="1">
-              <a:lnSpc>
-                <a:spcPct val="100000"/>
-              </a:lnSpc>
-              <a:spcBef>
-                <a:spcPts val="0"/>
-              </a:spcBef>
-              <a:spcAft>
-                <a:spcPts val="0"/>
-              </a:spcAft>
-              <a:buClrTx/>
-              <a:buSzTx/>
-              <a:buFontTx/>
-              <a:buNone/>
-              <a:tabLst/>
-              <a:defRPr/>
-            </a:pPr>
-            <a:endParaRPr kumimoji="0" lang="en-US" sz="1800" b="0" i="0" u="none" strike="noStrike" kern="1200" cap="none" spc="0" normalizeH="0" baseline="0" noProof="0">
-              <a:ln>
-                <a:noFill/>
-              </a:ln>
-              <a:solidFill>
-                <a:prstClr val="white"/>
-              </a:solidFill>
-              <a:effectLst/>
-              <a:uLnTx/>
-              <a:uFillTx/>
-              <a:latin typeface="Calibri" panose="020F0502020204030204"/>
-              <a:ea typeface="+mn-ea"/>
-              <a:cs typeface="+mn-cs"/>
-            </a:endParaRPr>
-          </a:p>
-        </p:txBody>
-      </p:sp>
-      <p:sp>
-        <p:nvSpPr>
-          <p:cNvPr id="3" name="Subtitle 2">
-            <a:extLst>
-              <a:ext uri="{FF2B5EF4-FFF2-40B4-BE49-F238E27FC236}">
-                <a16:creationId xmlns:a16="http://schemas.microsoft.com/office/drawing/2014/main" id="{C63068C7-FF93-4F55-8D49-8E391F78232D}"/>
-              </a:ext>
-            </a:extLst>
-          </p:cNvPr>
-          <p:cNvSpPr>
-            <a:spLocks noGrp="1"/>
-          </p:cNvSpPr>
-          <p:nvPr>
-            <p:ph type="subTitle" idx="1"/>
-          </p:nvPr>
-        </p:nvSpPr>
-        <p:spPr>
-          <a:xfrm>
             <a:off x="154916" y="1574584"/>
             <a:ext cx="4132756" cy="2124075"/>
           </a:xfrm>
@@ -9575,8 +8789,8 @@
         </p:nvSpPr>
         <p:spPr>
           <a:xfrm>
-            <a:off x="5572217" y="559293"/>
-            <a:ext cx="6314983" cy="5868139"/>
+            <a:off x="5548545" y="559293"/>
+            <a:ext cx="6338656" cy="5868139"/>
           </a:xfrm>
         </p:spPr>
         <p:txBody>
@@ -11138,7 +10352,7 @@
         <p:spPr>
           <a:xfrm>
             <a:off x="5117976" y="4448176"/>
-            <a:ext cx="6724835" cy="707886"/>
+            <a:ext cx="6724835" cy="1015663"/>
           </a:xfrm>
           <a:prstGeom prst="rect">
             <a:avLst/>
@@ -11153,13 +10367,13 @@
           <a:p>
             <a:r>
               <a:rPr lang="en-US" altLang="ko-KR" sz="2000" b="1" dirty="0"/>
-              <a:t>Customer is almost the same, but in Subscribers, </a:t>
+              <a:t>- Customer is almost the same</a:t>
             </a:r>
           </a:p>
           <a:p>
             <a:r>
               <a:rPr lang="en-US" altLang="ko-KR" sz="2000" b="1" dirty="0"/>
-              <a:t>Male is about three times more than Female.</a:t>
+              <a:t>- In Subscriber, Male is about three times more than Female.</a:t>
             </a:r>
             <a:endParaRPr lang="ko-KR" altLang="en-US" sz="2000" b="1" dirty="0"/>
           </a:p>
@@ -11882,42 +11096,6 @@
           </a:prstGeom>
         </p:spPr>
       </p:pic>
-      <p:sp>
-        <p:nvSpPr>
-          <p:cNvPr id="8" name="TextBox 7">
-            <a:extLst>
-              <a:ext uri="{FF2B5EF4-FFF2-40B4-BE49-F238E27FC236}">
-                <a16:creationId xmlns:a16="http://schemas.microsoft.com/office/drawing/2014/main" id="{7D34CFE6-6E3A-4F7D-89E7-B5BE12537EB6}"/>
-              </a:ext>
-            </a:extLst>
-          </p:cNvPr>
-          <p:cNvSpPr txBox="1"/>
-          <p:nvPr/>
-        </p:nvSpPr>
-        <p:spPr>
-          <a:xfrm>
-            <a:off x="5302187" y="4407736"/>
-            <a:ext cx="6886383" cy="1015663"/>
-          </a:xfrm>
-          <a:prstGeom prst="rect">
-            <a:avLst/>
-          </a:prstGeom>
-          <a:noFill/>
-        </p:spPr>
-        <p:txBody>
-          <a:bodyPr wrap="square">
-            <a:spAutoFit/>
-          </a:bodyPr>
-          <a:lstStyle/>
-          <a:p>
-            <a:r>
-              <a:rPr lang="en-US" altLang="ko-KR" sz="2000" b="1" dirty="0"/>
-              <a:t>Male Subscribers account for 60% of the total, overwhelmingly. We'll have to target Male Subscribers and create a business plan.</a:t>
-            </a:r>
-            <a:endParaRPr lang="ko-KR" altLang="en-US" sz="2000" b="1" dirty="0"/>
-          </a:p>
-        </p:txBody>
-      </p:sp>
     </p:spTree>
     <p:extLst>
       <p:ext uri="{BB962C8B-B14F-4D97-AF65-F5344CB8AC3E}">

</xml_diff>